<commit_message>
branches - cs - http
</commit_message>
<xml_diff>
--- a/Ceta-01-Git.pptx
+++ b/Ceta-01-Git.pptx
@@ -5,7 +5,7 @@
     <p:sldMasterId id="2147483648" r:id="rId1"/>
   </p:sldMasterIdLst>
   <p:notesMasterIdLst>
-    <p:notesMasterId r:id="rId12"/>
+    <p:notesMasterId r:id="rId14"/>
   </p:notesMasterIdLst>
   <p:sldIdLst>
     <p:sldId id="256" r:id="rId2"/>
@@ -16,8 +16,10 @@
     <p:sldId id="259" r:id="rId7"/>
     <p:sldId id="261" r:id="rId8"/>
     <p:sldId id="262" r:id="rId9"/>
-    <p:sldId id="264" r:id="rId10"/>
-    <p:sldId id="263" r:id="rId11"/>
+    <p:sldId id="266" r:id="rId10"/>
+    <p:sldId id="267" r:id="rId11"/>
+    <p:sldId id="264" r:id="rId12"/>
+    <p:sldId id="263" r:id="rId13"/>
   </p:sldIdLst>
   <p:sldSz cx="9144000" cy="6858000" type="screen4x3"/>
   <p:notesSz cx="6858000" cy="9144000"/>
@@ -3580,7 +3582,7 @@
         <p:spPr>
           <a:xfrm>
             <a:off x="2519264" y="5620598"/>
-            <a:ext cx="4032448" cy="369332"/>
+            <a:ext cx="4573016" cy="369332"/>
           </a:xfrm>
           <a:prstGeom prst="rect">
             <a:avLst/>
@@ -3606,6 +3608,7 @@
           </a:bodyPr>
           <a:lstStyle/>
           <a:p>
+            <a:pPr algn="ctr"/>
             <a:r>
               <a:rPr lang="es-ES" dirty="0" smtClean="0"/>
               <a:t>01 -  Sistema de control de versiones</a:t>
@@ -3624,10 +3627,420 @@
   <p:clrMapOvr>
     <a:masterClrMapping/>
   </p:clrMapOvr>
+  <p:timing>
+    <p:tnLst>
+      <p:par>
+        <p:cTn id="1" dur="indefinite" restart="never" nodeType="tmRoot"/>
+      </p:par>
+    </p:tnLst>
+  </p:timing>
 </p:sld>
 </file>
 
 <file path=ppt/slides/slide10.xml><?xml version="1.0" encoding="utf-8"?>
+<p:sld xmlns:a="http://schemas.openxmlformats.org/drawingml/2006/main" xmlns:r="http://schemas.openxmlformats.org/officeDocument/2006/relationships" xmlns:p="http://schemas.openxmlformats.org/presentationml/2006/main">
+  <p:cSld>
+    <p:spTree>
+      <p:nvGrpSpPr>
+        <p:cNvPr id="1" name=""/>
+        <p:cNvGrpSpPr/>
+        <p:nvPr/>
+      </p:nvGrpSpPr>
+      <p:grpSpPr>
+        <a:xfrm>
+          <a:off x="0" y="0"/>
+          <a:ext cx="0" cy="0"/>
+          <a:chOff x="0" y="0"/>
+          <a:chExt cx="0" cy="0"/>
+        </a:xfrm>
+      </p:grpSpPr>
+      <p:sp>
+        <p:nvSpPr>
+          <p:cNvPr id="2" name="1 Título"/>
+          <p:cNvSpPr>
+            <a:spLocks noGrp="1"/>
+          </p:cNvSpPr>
+          <p:nvPr>
+            <p:ph type="title"/>
+          </p:nvPr>
+        </p:nvSpPr>
+        <p:spPr/>
+        <p:txBody>
+          <a:bodyPr/>
+          <a:lstStyle/>
+          <a:p>
+            <a:r>
+              <a:rPr lang="es-ES" dirty="0" smtClean="0"/>
+              <a:t>Uso básico – </a:t>
+            </a:r>
+            <a:r>
+              <a:rPr lang="es-ES" dirty="0" err="1" smtClean="0"/>
+              <a:t>checkout</a:t>
+            </a:r>
+            <a:r>
+              <a:rPr lang="es-ES" dirty="0" smtClean="0"/>
+              <a:t>/</a:t>
+            </a:r>
+            <a:r>
+              <a:rPr lang="es-ES" dirty="0" err="1" smtClean="0"/>
+              <a:t>branch</a:t>
+            </a:r>
+            <a:endParaRPr lang="en-GB" dirty="0"/>
+          </a:p>
+        </p:txBody>
+      </p:sp>
+      <p:sp>
+        <p:nvSpPr>
+          <p:cNvPr id="3" name="2 Marcador de contenido"/>
+          <p:cNvSpPr>
+            <a:spLocks noGrp="1"/>
+          </p:cNvSpPr>
+          <p:nvPr>
+            <p:ph idx="1"/>
+          </p:nvPr>
+        </p:nvSpPr>
+        <p:spPr>
+          <a:xfrm>
+            <a:off x="457200" y="2204864"/>
+            <a:ext cx="8229600" cy="3921299"/>
+          </a:xfrm>
+        </p:spPr>
+        <p:txBody>
+          <a:bodyPr>
+            <a:normAutofit fontScale="62500" lnSpcReduction="20000"/>
+          </a:bodyPr>
+          <a:lstStyle/>
+          <a:p>
+            <a:pPr marL="0" indent="0">
+              <a:buNone/>
+            </a:pPr>
+            <a:r>
+              <a:rPr lang="es-ES" dirty="0" smtClean="0"/>
+              <a:t>	Ver ramas - </a:t>
+            </a:r>
+            <a:r>
+              <a:rPr lang="es-ES" b="1" dirty="0" err="1" smtClean="0"/>
+              <a:t>git</a:t>
+            </a:r>
+            <a:r>
+              <a:rPr lang="es-ES" b="1" dirty="0" smtClean="0"/>
+              <a:t> </a:t>
+            </a:r>
+            <a:r>
+              <a:rPr lang="es-ES" b="1" dirty="0" err="1" smtClean="0"/>
+              <a:t>branch</a:t>
+            </a:r>
+            <a:endParaRPr lang="es-ES" b="1" dirty="0" smtClean="0"/>
+          </a:p>
+          <a:p>
+            <a:pPr marL="0" indent="0" algn="ctr">
+              <a:buNone/>
+            </a:pPr>
+            <a:endParaRPr lang="es-ES" b="1" dirty="0" smtClean="0"/>
+          </a:p>
+          <a:p>
+            <a:pPr marL="0" indent="0">
+              <a:buNone/>
+            </a:pPr>
+            <a:r>
+              <a:rPr lang="es-ES" dirty="0"/>
+              <a:t>	</a:t>
+            </a:r>
+            <a:r>
+              <a:rPr lang="es-ES" dirty="0" smtClean="0"/>
+              <a:t>Crear rama - </a:t>
+            </a:r>
+            <a:r>
+              <a:rPr lang="en-GB" b="1" dirty="0" smtClean="0"/>
+              <a:t>git </a:t>
+            </a:r>
+            <a:r>
+              <a:rPr lang="en-GB" b="1" dirty="0"/>
+              <a:t>checkout -b </a:t>
+            </a:r>
+            <a:r>
+              <a:rPr lang="en-GB" b="1" dirty="0" smtClean="0"/>
+              <a:t>&lt;</a:t>
+            </a:r>
+            <a:r>
+              <a:rPr lang="en-GB" b="1" dirty="0" err="1" smtClean="0"/>
+              <a:t>rama</a:t>
+            </a:r>
+            <a:r>
+              <a:rPr lang="en-GB" b="1" dirty="0" smtClean="0"/>
+              <a:t>&gt;</a:t>
+            </a:r>
+          </a:p>
+          <a:p>
+            <a:pPr marL="0" indent="0">
+              <a:buNone/>
+            </a:pPr>
+            <a:endParaRPr lang="es-ES" dirty="0"/>
+          </a:p>
+          <a:p>
+            <a:pPr marL="0" indent="0">
+              <a:buNone/>
+            </a:pPr>
+            <a:r>
+              <a:rPr lang="es-ES" dirty="0"/>
+              <a:t>	</a:t>
+            </a:r>
+            <a:r>
+              <a:rPr lang="es-ES" dirty="0" smtClean="0"/>
+              <a:t>Cambiar de rama - </a:t>
+            </a:r>
+            <a:r>
+              <a:rPr lang="en-GB" b="1" dirty="0" smtClean="0"/>
+              <a:t>git </a:t>
+            </a:r>
+            <a:r>
+              <a:rPr lang="en-GB" b="1" dirty="0"/>
+              <a:t>checkout </a:t>
+            </a:r>
+            <a:r>
+              <a:rPr lang="en-GB" b="1" dirty="0" smtClean="0"/>
+              <a:t>master</a:t>
+            </a:r>
+          </a:p>
+          <a:p>
+            <a:pPr marL="0" indent="0">
+              <a:buNone/>
+            </a:pPr>
+            <a:endParaRPr lang="en-GB" dirty="0" smtClean="0"/>
+          </a:p>
+          <a:p>
+            <a:pPr marL="0" indent="0">
+              <a:buNone/>
+            </a:pPr>
+            <a:r>
+              <a:rPr lang="es-ES" dirty="0"/>
+              <a:t>	</a:t>
+            </a:r>
+            <a:r>
+              <a:rPr lang="es-ES" dirty="0" smtClean="0"/>
+              <a:t>Borrar rama - </a:t>
+            </a:r>
+            <a:r>
+              <a:rPr lang="en-GB" b="1" dirty="0" smtClean="0"/>
+              <a:t>git </a:t>
+            </a:r>
+            <a:r>
+              <a:rPr lang="en-GB" b="1" dirty="0"/>
+              <a:t>branch -d </a:t>
+            </a:r>
+            <a:r>
+              <a:rPr lang="en-GB" b="1" dirty="0" smtClean="0"/>
+              <a:t>&lt;</a:t>
+            </a:r>
+            <a:r>
+              <a:rPr lang="en-GB" b="1" dirty="0" err="1" smtClean="0"/>
+              <a:t>rama</a:t>
+            </a:r>
+            <a:r>
+              <a:rPr lang="en-GB" b="1" dirty="0" smtClean="0"/>
+              <a:t>&gt;</a:t>
+            </a:r>
+          </a:p>
+          <a:p>
+            <a:pPr marL="0" indent="0">
+              <a:buNone/>
+            </a:pPr>
+            <a:endParaRPr lang="es-ES" b="1" dirty="0"/>
+          </a:p>
+          <a:p>
+            <a:pPr marL="0" indent="0">
+              <a:buNone/>
+            </a:pPr>
+            <a:r>
+              <a:rPr lang="es-ES" dirty="0" smtClean="0"/>
+              <a:t>	Mezclar ramas </a:t>
+            </a:r>
+            <a:r>
+              <a:rPr lang="es-ES" b="1" dirty="0" smtClean="0"/>
+              <a:t>- </a:t>
+            </a:r>
+            <a:r>
+              <a:rPr lang="en-GB" b="1" dirty="0"/>
+              <a:t>git merge </a:t>
+            </a:r>
+            <a:r>
+              <a:rPr lang="en-GB" b="1" dirty="0" smtClean="0"/>
+              <a:t>&lt;</a:t>
+            </a:r>
+            <a:r>
+              <a:rPr lang="en-GB" b="1" dirty="0" err="1" smtClean="0"/>
+              <a:t>rama</a:t>
+            </a:r>
+            <a:r>
+              <a:rPr lang="en-GB" b="1" dirty="0" smtClean="0"/>
+              <a:t>&gt;</a:t>
+            </a:r>
+            <a:endParaRPr lang="es-ES" b="1" dirty="0"/>
+          </a:p>
+          <a:p>
+            <a:pPr marL="0" indent="0">
+              <a:buNone/>
+            </a:pPr>
+            <a:r>
+              <a:rPr lang="es-ES" dirty="0"/>
+              <a:t>	</a:t>
+            </a:r>
+            <a:endParaRPr lang="es-ES" dirty="0" smtClean="0"/>
+          </a:p>
+          <a:p>
+            <a:pPr marL="0" indent="0">
+              <a:buNone/>
+            </a:pPr>
+            <a:r>
+              <a:rPr lang="es-ES" dirty="0"/>
+              <a:t>	</a:t>
+            </a:r>
+            <a:endParaRPr lang="es-ES" dirty="0" smtClean="0"/>
+          </a:p>
+          <a:p>
+            <a:pPr marL="0" indent="0">
+              <a:buNone/>
+            </a:pPr>
+            <a:r>
+              <a:rPr lang="es-ES" dirty="0"/>
+              <a:t>	</a:t>
+            </a:r>
+            <a:endParaRPr lang="en-GB" dirty="0"/>
+          </a:p>
+        </p:txBody>
+      </p:sp>
+    </p:spTree>
+    <p:extLst>
+      <p:ext uri="{BB962C8B-B14F-4D97-AF65-F5344CB8AC3E}">
+        <p14:creationId xmlns:p14="http://schemas.microsoft.com/office/powerpoint/2010/main" val="3441538986"/>
+      </p:ext>
+    </p:extLst>
+  </p:cSld>
+  <p:clrMapOvr>
+    <a:masterClrMapping/>
+  </p:clrMapOvr>
+  <p:timing>
+    <p:tnLst>
+      <p:par>
+        <p:cTn id="1" dur="indefinite" restart="never" nodeType="tmRoot"/>
+      </p:par>
+    </p:tnLst>
+  </p:timing>
+</p:sld>
+</file>
+
+<file path=ppt/slides/slide11.xml><?xml version="1.0" encoding="utf-8"?>
+<p:sld xmlns:a="http://schemas.openxmlformats.org/drawingml/2006/main" xmlns:r="http://schemas.openxmlformats.org/officeDocument/2006/relationships" xmlns:p="http://schemas.openxmlformats.org/presentationml/2006/main">
+  <p:cSld>
+    <p:spTree>
+      <p:nvGrpSpPr>
+        <p:cNvPr id="1" name=""/>
+        <p:cNvGrpSpPr/>
+        <p:nvPr/>
+      </p:nvGrpSpPr>
+      <p:grpSpPr>
+        <a:xfrm>
+          <a:off x="0" y="0"/>
+          <a:ext cx="0" cy="0"/>
+          <a:chOff x="0" y="0"/>
+          <a:chExt cx="0" cy="0"/>
+        </a:xfrm>
+      </p:grpSpPr>
+      <p:sp>
+        <p:nvSpPr>
+          <p:cNvPr id="2" name="1 Título"/>
+          <p:cNvSpPr>
+            <a:spLocks noGrp="1"/>
+          </p:cNvSpPr>
+          <p:nvPr>
+            <p:ph type="title"/>
+          </p:nvPr>
+        </p:nvSpPr>
+        <p:spPr/>
+        <p:txBody>
+          <a:bodyPr/>
+          <a:lstStyle/>
+          <a:p>
+            <a:r>
+              <a:rPr lang="es-ES" dirty="0" smtClean="0"/>
+              <a:t>Enlaces de interés</a:t>
+            </a:r>
+            <a:endParaRPr lang="en-GB" dirty="0"/>
+          </a:p>
+        </p:txBody>
+      </p:sp>
+      <p:sp>
+        <p:nvSpPr>
+          <p:cNvPr id="3" name="2 Marcador de contenido"/>
+          <p:cNvSpPr>
+            <a:spLocks noGrp="1"/>
+          </p:cNvSpPr>
+          <p:nvPr>
+            <p:ph idx="1"/>
+          </p:nvPr>
+        </p:nvSpPr>
+        <p:spPr/>
+        <p:txBody>
+          <a:bodyPr/>
+          <a:lstStyle/>
+          <a:p>
+            <a:endParaRPr lang="en-GB" dirty="0" smtClean="0">
+              <a:hlinkClick r:id="rId2"/>
+            </a:endParaRPr>
+          </a:p>
+          <a:p>
+            <a:r>
+              <a:rPr lang="en-GB" dirty="0" smtClean="0">
+                <a:hlinkClick r:id="rId2"/>
+              </a:rPr>
+              <a:t>https://git-scm.com/docs/git</a:t>
+            </a:r>
+            <a:endParaRPr lang="en-GB" dirty="0" smtClean="0"/>
+          </a:p>
+          <a:p>
+            <a:r>
+              <a:rPr lang="en-GB" dirty="0" smtClean="0">
+                <a:hlinkClick r:id="rId3"/>
+              </a:rPr>
+              <a:t>https://es.wikipedia.org/wiki/Git</a:t>
+            </a:r>
+            <a:endParaRPr lang="en-GB" dirty="0" smtClean="0"/>
+          </a:p>
+          <a:p>
+            <a:r>
+              <a:rPr lang="en-GB" dirty="0" smtClean="0">
+                <a:hlinkClick r:id="rId4"/>
+              </a:rPr>
+              <a:t>https://git-scm.com/book/en/v1/Getting-Started-Git-Basics#_the_three_states</a:t>
+            </a:r>
+            <a:endParaRPr lang="en-GB" dirty="0" smtClean="0"/>
+          </a:p>
+          <a:p>
+            <a:endParaRPr lang="en-GB" dirty="0"/>
+          </a:p>
+        </p:txBody>
+      </p:sp>
+    </p:spTree>
+    <p:extLst>
+      <p:ext uri="{BB962C8B-B14F-4D97-AF65-F5344CB8AC3E}">
+        <p14:creationId xmlns:p14="http://schemas.microsoft.com/office/powerpoint/2010/main" val="1617905666"/>
+      </p:ext>
+    </p:extLst>
+  </p:cSld>
+  <p:clrMapOvr>
+    <a:masterClrMapping/>
+  </p:clrMapOvr>
+  <p:timing>
+    <p:tnLst>
+      <p:par>
+        <p:cTn id="1" dur="indefinite" restart="never" nodeType="tmRoot"/>
+      </p:par>
+    </p:tnLst>
+  </p:timing>
+</p:sld>
+</file>
+
+<file path=ppt/slides/slide12.xml><?xml version="1.0" encoding="utf-8"?>
 <p:sld xmlns:a="http://schemas.openxmlformats.org/drawingml/2006/main" xmlns:r="http://schemas.openxmlformats.org/officeDocument/2006/relationships" xmlns:p="http://schemas.openxmlformats.org/presentationml/2006/main">
   <p:cSld>
     <p:spTree>
@@ -3684,6 +4097,13 @@
   <p:clrMapOvr>
     <a:masterClrMapping/>
   </p:clrMapOvr>
+  <p:timing>
+    <p:tnLst>
+      <p:par>
+        <p:cTn id="1" dur="indefinite" restart="never" nodeType="tmRoot"/>
+      </p:par>
+    </p:tnLst>
+  </p:timing>
 </p:sld>
 </file>
 
@@ -3791,6 +4211,13 @@
   <p:clrMapOvr>
     <a:masterClrMapping/>
   </p:clrMapOvr>
+  <p:timing>
+    <p:tnLst>
+      <p:par>
+        <p:cTn id="1" dur="indefinite" restart="never" nodeType="tmRoot"/>
+      </p:par>
+    </p:tnLst>
+  </p:timing>
 </p:sld>
 </file>
 
@@ -3926,6 +4353,13 @@
   <p:clrMapOvr>
     <a:masterClrMapping/>
   </p:clrMapOvr>
+  <p:timing>
+    <p:tnLst>
+      <p:par>
+        <p:cTn id="1" dur="indefinite" restart="never" nodeType="tmRoot"/>
+      </p:par>
+    </p:tnLst>
+  </p:timing>
 </p:sld>
 </file>
 
@@ -4058,6 +4492,13 @@
   <p:clrMapOvr>
     <a:masterClrMapping/>
   </p:clrMapOvr>
+  <p:timing>
+    <p:tnLst>
+      <p:par>
+        <p:cTn id="1" dur="indefinite" restart="never" nodeType="tmRoot"/>
+      </p:par>
+    </p:tnLst>
+  </p:timing>
 </p:sld>
 </file>
 
@@ -4185,6 +4626,13 @@
   <p:clrMapOvr>
     <a:masterClrMapping/>
   </p:clrMapOvr>
+  <p:timing>
+    <p:tnLst>
+      <p:par>
+        <p:cTn id="1" dur="indefinite" restart="never" nodeType="tmRoot"/>
+      </p:par>
+    </p:tnLst>
+  </p:timing>
 </p:sld>
 </file>
 
@@ -4318,6 +4766,13 @@
   <p:clrMapOvr>
     <a:masterClrMapping/>
   </p:clrMapOvr>
+  <p:timing>
+    <p:tnLst>
+      <p:par>
+        <p:cTn id="1" dur="indefinite" restart="never" nodeType="tmRoot"/>
+      </p:par>
+    </p:tnLst>
+  </p:timing>
 </p:sld>
 </file>
 
@@ -4395,13 +4850,7 @@
               <a:rPr lang="en-GB" b="1" dirty="0" smtClean="0">
                 <a:effectLst/>
               </a:rPr>
-              <a:t>git commit –m </a:t>
-            </a:r>
-            <a:r>
-              <a:rPr lang="en-GB" b="1" dirty="0" smtClean="0">
-                <a:effectLst/>
-              </a:rPr>
-              <a:t> </a:t>
+              <a:t>git commit –m  </a:t>
             </a:r>
             <a:r>
               <a:rPr lang="en-GB" dirty="0" smtClean="0"/>
@@ -4465,6 +4914,13 @@
   <p:clrMapOvr>
     <a:masterClrMapping/>
   </p:clrMapOvr>
+  <p:timing>
+    <p:tnLst>
+      <p:par>
+        <p:cTn id="1" dur="indefinite" restart="never" nodeType="tmRoot"/>
+      </p:par>
+    </p:tnLst>
+  </p:timing>
 </p:sld>
 </file>
 
@@ -4612,6 +5068,13 @@
   <p:clrMapOvr>
     <a:masterClrMapping/>
   </p:clrMapOvr>
+  <p:timing>
+    <p:tnLst>
+      <p:par>
+        <p:cTn id="1" dur="indefinite" restart="never" nodeType="tmRoot"/>
+      </p:par>
+    </p:tnLst>
+  </p:timing>
 </p:sld>
 </file>
 
@@ -4649,7 +5112,11 @@
           <a:p>
             <a:r>
               <a:rPr lang="es-ES" dirty="0" smtClean="0"/>
-              <a:t>Enlaces de interés</a:t>
+              <a:t>Uso básico - </a:t>
+            </a:r>
+            <a:r>
+              <a:rPr lang="es-ES" dirty="0" err="1" smtClean="0"/>
+              <a:t>branching</a:t>
             </a:r>
             <a:endParaRPr lang="en-GB" dirty="0"/>
           </a:p>
@@ -4670,52 +5137,89 @@
           <a:bodyPr/>
           <a:lstStyle/>
           <a:p>
-            <a:endParaRPr lang="en-GB" dirty="0" smtClean="0">
-              <a:hlinkClick r:id="rId2"/>
-            </a:endParaRPr>
-          </a:p>
-          <a:p>
-            <a:r>
-              <a:rPr lang="en-GB" dirty="0" smtClean="0">
-                <a:hlinkClick r:id="rId2"/>
-              </a:rPr>
-              <a:t>https://git-scm.com/docs/git</a:t>
-            </a:r>
-            <a:endParaRPr lang="en-GB" dirty="0" smtClean="0"/>
-          </a:p>
-          <a:p>
-            <a:r>
-              <a:rPr lang="en-GB" dirty="0" smtClean="0">
-                <a:hlinkClick r:id="rId3"/>
-              </a:rPr>
-              <a:t>https://es.wikipedia.org/wiki/Git</a:t>
-            </a:r>
-            <a:endParaRPr lang="en-GB" dirty="0" smtClean="0"/>
-          </a:p>
-          <a:p>
-            <a:r>
-              <a:rPr lang="en-GB" dirty="0" smtClean="0">
-                <a:hlinkClick r:id="rId4"/>
-              </a:rPr>
-              <a:t>https://git-scm.com/book/en/v1/Getting-Started-Git-Basics#_the_three_states</a:t>
-            </a:r>
-            <a:endParaRPr lang="en-GB" dirty="0" smtClean="0"/>
-          </a:p>
-          <a:p>
+            <a:pPr marL="457200" lvl="1" indent="0">
+              <a:buNone/>
+            </a:pPr>
+            <a:r>
+              <a:rPr lang="es-ES" dirty="0" smtClean="0"/>
+              <a:t>La ramas (</a:t>
+            </a:r>
+            <a:r>
+              <a:rPr lang="es-ES" dirty="0" err="1" smtClean="0"/>
+              <a:t>branches</a:t>
+            </a:r>
+            <a:r>
+              <a:rPr lang="es-ES" dirty="0" smtClean="0"/>
+              <a:t>) son utilizadas para añadir/corregir funcionalidades de forma aislada.</a:t>
+            </a:r>
+          </a:p>
+          <a:p>
+            <a:pPr marL="457200" lvl="1" indent="0">
+              <a:buNone/>
+            </a:pPr>
+            <a:endParaRPr lang="es-ES" dirty="0"/>
+          </a:p>
+          <a:p>
+            <a:pPr marL="457200" lvl="1" indent="0">
+              <a:buNone/>
+            </a:pPr>
+            <a:endParaRPr lang="es-ES" dirty="0" smtClean="0"/>
+          </a:p>
+          <a:p>
+            <a:pPr marL="457200" lvl="1" indent="0">
+              <a:buNone/>
+            </a:pPr>
             <a:endParaRPr lang="en-GB" dirty="0"/>
           </a:p>
         </p:txBody>
       </p:sp>
+      <p:pic>
+        <p:nvPicPr>
+          <p:cNvPr id="4" name="3 Imagen"/>
+          <p:cNvPicPr>
+            <a:picLocks noChangeAspect="1"/>
+          </p:cNvPicPr>
+          <p:nvPr/>
+        </p:nvPicPr>
+        <p:blipFill>
+          <a:blip r:embed="rId2">
+            <a:extLst>
+              <a:ext uri="{28A0092B-C50C-407E-A947-70E740481C1C}">
+                <a14:useLocalDpi xmlns:a14="http://schemas.microsoft.com/office/drawing/2010/main" val="0"/>
+              </a:ext>
+            </a:extLst>
+          </a:blip>
+          <a:stretch>
+            <a:fillRect/>
+          </a:stretch>
+        </p:blipFill>
+        <p:spPr>
+          <a:xfrm>
+            <a:off x="467544" y="2564904"/>
+            <a:ext cx="8208912" cy="3166252"/>
+          </a:xfrm>
+          <a:prstGeom prst="rect">
+            <a:avLst/>
+          </a:prstGeom>
+        </p:spPr>
+      </p:pic>
     </p:spTree>
     <p:extLst>
       <p:ext uri="{BB962C8B-B14F-4D97-AF65-F5344CB8AC3E}">
-        <p14:creationId xmlns:p14="http://schemas.microsoft.com/office/powerpoint/2010/main" val="1617905666"/>
+        <p14:creationId xmlns:p14="http://schemas.microsoft.com/office/powerpoint/2010/main" val="259093509"/>
       </p:ext>
     </p:extLst>
   </p:cSld>
   <p:clrMapOvr>
     <a:masterClrMapping/>
   </p:clrMapOvr>
+  <p:timing>
+    <p:tnLst>
+      <p:par>
+        <p:cTn id="1" dur="indefinite" restart="never" nodeType="tmRoot"/>
+      </p:par>
+    </p:tnLst>
+  </p:timing>
 </p:sld>
 </file>
 

</xml_diff>